<commit_message>
Postman Blog y reflexion
</commit_message>
<xml_diff>
--- a/Reflexión Final.pptx
+++ b/Reflexión Final.pptx
@@ -9,6 +9,7 @@
     <p:sldId id="257" r:id="rId3"/>
     <p:sldId id="258" r:id="rId4"/>
     <p:sldId id="259" r:id="rId5"/>
+    <p:sldId id="261" r:id="rId6"/>
   </p:sldIdLst>
   <p:sldSz cx="12192000" cy="6858000"/>
   <p:notesSz cx="6858000" cy="9144000"/>
@@ -107,6 +108,11 @@
       </a:defRPr>
     </a:lvl9pPr>
   </p:defaultTextStyle>
+  <p:extLst>
+    <p:ext uri="{EFAFB233-063F-42B5-8137-9DF3F51BA10A}">
+      <p15:sldGuideLst xmlns:p15="http://schemas.microsoft.com/office/powerpoint/2012/main"/>
+    </p:ext>
+  </p:extLst>
 </p:presentation>
 </file>
 
@@ -1412,7 +1418,7 @@
           </a:lstStyle>
           <a:p>
             <a:r>
-              <a:rPr lang="es-ES" smtClean="0"/>
+              <a:rPr lang="es-ES"/>
               <a:t>Haga clic para modificar el estilo de título del patrón</a:t>
             </a:r>
             <a:endParaRPr lang="en-US" dirty="0"/>
@@ -1486,7 +1492,7 @@
           </a:lstStyle>
           <a:p>
             <a:r>
-              <a:rPr lang="es-ES" smtClean="0"/>
+              <a:rPr lang="es-ES"/>
               <a:t>Haga clic para editar el estilo de subtítulo del patrón</a:t>
             </a:r>
             <a:endParaRPr lang="en-US" dirty="0"/>
@@ -1519,7 +1525,7 @@
           <a:p>
             <a:fld id="{B38D9DF4-9BC4-446F-AB7D-0B53BCD7F2A4}" type="datetimeFigureOut">
               <a:rPr lang="en-US" smtClean="0"/>
-              <a:t>10/9/2019</a:t>
+              <a:t>10/10/2019</a:t>
             </a:fld>
             <a:endParaRPr lang="en-US"/>
           </a:p>
@@ -2897,7 +2903,7 @@
           </a:lstStyle>
           <a:p>
             <a:r>
-              <a:rPr lang="es-ES" smtClean="0"/>
+              <a:rPr lang="es-ES"/>
               <a:t>Haga clic para modificar el estilo de título del patrón</a:t>
             </a:r>
             <a:endParaRPr lang="en-US" dirty="0"/>
@@ -2926,35 +2932,35 @@
           <a:p>
             <a:pPr lvl="0"/>
             <a:r>
-              <a:rPr lang="es-ES" smtClean="0"/>
+              <a:rPr lang="es-ES"/>
               <a:t>Editar el estilo de texto del patrón</a:t>
             </a:r>
           </a:p>
           <a:p>
             <a:pPr lvl="1"/>
             <a:r>
-              <a:rPr lang="es-ES" smtClean="0"/>
+              <a:rPr lang="es-ES"/>
               <a:t>Segundo nivel</a:t>
             </a:r>
           </a:p>
           <a:p>
             <a:pPr lvl="2"/>
             <a:r>
-              <a:rPr lang="es-ES" smtClean="0"/>
+              <a:rPr lang="es-ES"/>
               <a:t>Tercer nivel</a:t>
             </a:r>
           </a:p>
           <a:p>
             <a:pPr lvl="3"/>
             <a:r>
-              <a:rPr lang="es-ES" smtClean="0"/>
+              <a:rPr lang="es-ES"/>
               <a:t>Cuarto nivel</a:t>
             </a:r>
           </a:p>
           <a:p>
             <a:pPr lvl="4"/>
             <a:r>
-              <a:rPr lang="es-ES" smtClean="0"/>
+              <a:rPr lang="es-ES"/>
               <a:t>Quinto nivel</a:t>
             </a:r>
             <a:endParaRPr lang="en-US" dirty="0"/>
@@ -2978,7 +2984,7 @@
           <a:p>
             <a:fld id="{B38D9DF4-9BC4-446F-AB7D-0B53BCD7F2A4}" type="datetimeFigureOut">
               <a:rPr lang="en-US" smtClean="0"/>
-              <a:t>10/9/2019</a:t>
+              <a:t>10/10/2019</a:t>
             </a:fld>
             <a:endParaRPr lang="en-US"/>
           </a:p>
@@ -4345,7 +4351,7 @@
           </a:lstStyle>
           <a:p>
             <a:r>
-              <a:rPr lang="es-ES" smtClean="0"/>
+              <a:rPr lang="es-ES"/>
               <a:t>Haga clic para modificar el estilo de título del patrón</a:t>
             </a:r>
             <a:endParaRPr lang="en-US" dirty="0"/>
@@ -4374,35 +4380,35 @@
           <a:p>
             <a:pPr lvl="0"/>
             <a:r>
-              <a:rPr lang="es-ES" smtClean="0"/>
+              <a:rPr lang="es-ES"/>
               <a:t>Editar el estilo de texto del patrón</a:t>
             </a:r>
           </a:p>
           <a:p>
             <a:pPr lvl="1"/>
             <a:r>
-              <a:rPr lang="es-ES" smtClean="0"/>
+              <a:rPr lang="es-ES"/>
               <a:t>Segundo nivel</a:t>
             </a:r>
           </a:p>
           <a:p>
             <a:pPr lvl="2"/>
             <a:r>
-              <a:rPr lang="es-ES" smtClean="0"/>
+              <a:rPr lang="es-ES"/>
               <a:t>Tercer nivel</a:t>
             </a:r>
           </a:p>
           <a:p>
             <a:pPr lvl="3"/>
             <a:r>
-              <a:rPr lang="es-ES" smtClean="0"/>
+              <a:rPr lang="es-ES"/>
               <a:t>Cuarto nivel</a:t>
             </a:r>
           </a:p>
           <a:p>
             <a:pPr lvl="4"/>
             <a:r>
-              <a:rPr lang="es-ES" smtClean="0"/>
+              <a:rPr lang="es-ES"/>
               <a:t>Quinto nivel</a:t>
             </a:r>
             <a:endParaRPr lang="en-US" dirty="0"/>
@@ -4431,7 +4437,7 @@
           <a:p>
             <a:fld id="{B38D9DF4-9BC4-446F-AB7D-0B53BCD7F2A4}" type="datetimeFigureOut">
               <a:rPr lang="en-US" smtClean="0"/>
-              <a:t>10/9/2019</a:t>
+              <a:t>10/10/2019</a:t>
             </a:fld>
             <a:endParaRPr lang="en-US"/>
           </a:p>
@@ -5805,7 +5811,7 @@
           </a:lstStyle>
           <a:p>
             <a:r>
-              <a:rPr lang="es-ES" smtClean="0"/>
+              <a:rPr lang="es-ES"/>
               <a:t>Haga clic para modificar el estilo de título del patrón</a:t>
             </a:r>
             <a:endParaRPr lang="en-US" dirty="0"/>
@@ -5834,35 +5840,35 @@
           <a:p>
             <a:pPr lvl="0"/>
             <a:r>
-              <a:rPr lang="es-ES" smtClean="0"/>
+              <a:rPr lang="es-ES"/>
               <a:t>Editar el estilo de texto del patrón</a:t>
             </a:r>
           </a:p>
           <a:p>
             <a:pPr lvl="1"/>
             <a:r>
-              <a:rPr lang="es-ES" smtClean="0"/>
+              <a:rPr lang="es-ES"/>
               <a:t>Segundo nivel</a:t>
             </a:r>
           </a:p>
           <a:p>
             <a:pPr lvl="2"/>
             <a:r>
-              <a:rPr lang="es-ES" smtClean="0"/>
+              <a:rPr lang="es-ES"/>
               <a:t>Tercer nivel</a:t>
             </a:r>
           </a:p>
           <a:p>
             <a:pPr lvl="3"/>
             <a:r>
-              <a:rPr lang="es-ES" smtClean="0"/>
+              <a:rPr lang="es-ES"/>
               <a:t>Cuarto nivel</a:t>
             </a:r>
           </a:p>
           <a:p>
             <a:pPr lvl="4"/>
             <a:r>
-              <a:rPr lang="es-ES" smtClean="0"/>
+              <a:rPr lang="es-ES"/>
               <a:t>Quinto nivel</a:t>
             </a:r>
             <a:endParaRPr lang="en-US" dirty="0"/>
@@ -5886,7 +5892,7 @@
           <a:p>
             <a:fld id="{B38D9DF4-9BC4-446F-AB7D-0B53BCD7F2A4}" type="datetimeFigureOut">
               <a:rPr lang="en-US" smtClean="0"/>
-              <a:t>10/9/2019</a:t>
+              <a:t>10/10/2019</a:t>
             </a:fld>
             <a:endParaRPr lang="en-US"/>
           </a:p>
@@ -7246,7 +7252,7 @@
           </a:lstStyle>
           <a:p>
             <a:r>
-              <a:rPr lang="es-ES" smtClean="0"/>
+              <a:rPr lang="es-ES"/>
               <a:t>Haga clic para modificar el estilo de título del patrón</a:t>
             </a:r>
             <a:endParaRPr lang="en-US" dirty="0"/>
@@ -7366,7 +7372,7 @@
           <a:p>
             <a:pPr lvl="0"/>
             <a:r>
-              <a:rPr lang="es-ES" smtClean="0"/>
+              <a:rPr lang="es-ES"/>
               <a:t>Editar el estilo de texto del patrón</a:t>
             </a:r>
           </a:p>
@@ -7394,7 +7400,7 @@
           <a:p>
             <a:fld id="{B38D9DF4-9BC4-446F-AB7D-0B53BCD7F2A4}" type="datetimeFigureOut">
               <a:rPr lang="en-US" smtClean="0"/>
-              <a:t>10/9/2019</a:t>
+              <a:t>10/10/2019</a:t>
             </a:fld>
             <a:endParaRPr lang="en-US"/>
           </a:p>
@@ -8772,7 +8778,7 @@
           </a:lstStyle>
           <a:p>
             <a:r>
-              <a:rPr lang="es-ES" smtClean="0"/>
+              <a:rPr lang="es-ES"/>
               <a:t>Haga clic para modificar el estilo de título del patrón</a:t>
             </a:r>
             <a:endParaRPr lang="en-US" dirty="0"/>
@@ -8801,35 +8807,35 @@
           <a:p>
             <a:pPr lvl="0"/>
             <a:r>
-              <a:rPr lang="es-ES" smtClean="0"/>
+              <a:rPr lang="es-ES"/>
               <a:t>Editar el estilo de texto del patrón</a:t>
             </a:r>
           </a:p>
           <a:p>
             <a:pPr lvl="1"/>
             <a:r>
-              <a:rPr lang="es-ES" smtClean="0"/>
+              <a:rPr lang="es-ES"/>
               <a:t>Segundo nivel</a:t>
             </a:r>
           </a:p>
           <a:p>
             <a:pPr lvl="2"/>
             <a:r>
-              <a:rPr lang="es-ES" smtClean="0"/>
+              <a:rPr lang="es-ES"/>
               <a:t>Tercer nivel</a:t>
             </a:r>
           </a:p>
           <a:p>
             <a:pPr lvl="3"/>
             <a:r>
-              <a:rPr lang="es-ES" smtClean="0"/>
+              <a:rPr lang="es-ES"/>
               <a:t>Cuarto nivel</a:t>
             </a:r>
           </a:p>
           <a:p>
             <a:pPr lvl="4"/>
             <a:r>
-              <a:rPr lang="es-ES" smtClean="0"/>
+              <a:rPr lang="es-ES"/>
               <a:t>Quinto nivel</a:t>
             </a:r>
             <a:endParaRPr lang="en-US" dirty="0"/>
@@ -8858,35 +8864,35 @@
           <a:p>
             <a:pPr lvl="0"/>
             <a:r>
-              <a:rPr lang="es-ES" smtClean="0"/>
+              <a:rPr lang="es-ES"/>
               <a:t>Editar el estilo de texto del patrón</a:t>
             </a:r>
           </a:p>
           <a:p>
             <a:pPr lvl="1"/>
             <a:r>
-              <a:rPr lang="es-ES" smtClean="0"/>
+              <a:rPr lang="es-ES"/>
               <a:t>Segundo nivel</a:t>
             </a:r>
           </a:p>
           <a:p>
             <a:pPr lvl="2"/>
             <a:r>
-              <a:rPr lang="es-ES" smtClean="0"/>
+              <a:rPr lang="es-ES"/>
               <a:t>Tercer nivel</a:t>
             </a:r>
           </a:p>
           <a:p>
             <a:pPr lvl="3"/>
             <a:r>
-              <a:rPr lang="es-ES" smtClean="0"/>
+              <a:rPr lang="es-ES"/>
               <a:t>Cuarto nivel</a:t>
             </a:r>
           </a:p>
           <a:p>
             <a:pPr lvl="4"/>
             <a:r>
-              <a:rPr lang="es-ES" smtClean="0"/>
+              <a:rPr lang="es-ES"/>
               <a:t>Quinto nivel</a:t>
             </a:r>
             <a:endParaRPr lang="en-US" dirty="0"/>
@@ -8915,7 +8921,7 @@
           <a:p>
             <a:fld id="{B38D9DF4-9BC4-446F-AB7D-0B53BCD7F2A4}" type="datetimeFigureOut">
               <a:rPr lang="en-US" smtClean="0"/>
-              <a:t>10/9/2019</a:t>
+              <a:t>10/10/2019</a:t>
             </a:fld>
             <a:endParaRPr lang="en-US"/>
           </a:p>
@@ -10289,7 +10295,7 @@
           </a:lstStyle>
           <a:p>
             <a:r>
-              <a:rPr lang="es-ES" smtClean="0"/>
+              <a:rPr lang="es-ES"/>
               <a:t>Haga clic para modificar el estilo de título del patrón</a:t>
             </a:r>
             <a:endParaRPr lang="en-US" dirty="0"/>
@@ -10364,7 +10370,7 @@
           <a:p>
             <a:pPr lvl="0"/>
             <a:r>
-              <a:rPr lang="es-ES" smtClean="0"/>
+              <a:rPr lang="es-ES"/>
               <a:t>Editar el estilo de texto del patrón</a:t>
             </a:r>
           </a:p>
@@ -10392,35 +10398,35 @@
           <a:p>
             <a:pPr lvl="0"/>
             <a:r>
-              <a:rPr lang="es-ES" smtClean="0"/>
+              <a:rPr lang="es-ES"/>
               <a:t>Editar el estilo de texto del patrón</a:t>
             </a:r>
           </a:p>
           <a:p>
             <a:pPr lvl="1"/>
             <a:r>
-              <a:rPr lang="es-ES" smtClean="0"/>
+              <a:rPr lang="es-ES"/>
               <a:t>Segundo nivel</a:t>
             </a:r>
           </a:p>
           <a:p>
             <a:pPr lvl="2"/>
             <a:r>
-              <a:rPr lang="es-ES" smtClean="0"/>
+              <a:rPr lang="es-ES"/>
               <a:t>Tercer nivel</a:t>
             </a:r>
           </a:p>
           <a:p>
             <a:pPr lvl="3"/>
             <a:r>
-              <a:rPr lang="es-ES" smtClean="0"/>
+              <a:rPr lang="es-ES"/>
               <a:t>Cuarto nivel</a:t>
             </a:r>
           </a:p>
           <a:p>
             <a:pPr lvl="4"/>
             <a:r>
-              <a:rPr lang="es-ES" smtClean="0"/>
+              <a:rPr lang="es-ES"/>
               <a:t>Quinto nivel</a:t>
             </a:r>
             <a:endParaRPr lang="en-US" dirty="0"/>
@@ -10495,7 +10501,7 @@
           <a:p>
             <a:pPr lvl="0"/>
             <a:r>
-              <a:rPr lang="es-ES" smtClean="0"/>
+              <a:rPr lang="es-ES"/>
               <a:t>Editar el estilo de texto del patrón</a:t>
             </a:r>
           </a:p>
@@ -10523,35 +10529,35 @@
           <a:p>
             <a:pPr lvl="0"/>
             <a:r>
-              <a:rPr lang="es-ES" smtClean="0"/>
+              <a:rPr lang="es-ES"/>
               <a:t>Editar el estilo de texto del patrón</a:t>
             </a:r>
           </a:p>
           <a:p>
             <a:pPr lvl="1"/>
             <a:r>
-              <a:rPr lang="es-ES" smtClean="0"/>
+              <a:rPr lang="es-ES"/>
               <a:t>Segundo nivel</a:t>
             </a:r>
           </a:p>
           <a:p>
             <a:pPr lvl="2"/>
             <a:r>
-              <a:rPr lang="es-ES" smtClean="0"/>
+              <a:rPr lang="es-ES"/>
               <a:t>Tercer nivel</a:t>
             </a:r>
           </a:p>
           <a:p>
             <a:pPr lvl="3"/>
             <a:r>
-              <a:rPr lang="es-ES" smtClean="0"/>
+              <a:rPr lang="es-ES"/>
               <a:t>Cuarto nivel</a:t>
             </a:r>
           </a:p>
           <a:p>
             <a:pPr lvl="4"/>
             <a:r>
-              <a:rPr lang="es-ES" smtClean="0"/>
+              <a:rPr lang="es-ES"/>
               <a:t>Quinto nivel</a:t>
             </a:r>
             <a:endParaRPr lang="en-US" dirty="0"/>
@@ -10580,7 +10586,7 @@
           <a:p>
             <a:fld id="{B38D9DF4-9BC4-446F-AB7D-0B53BCD7F2A4}" type="datetimeFigureOut">
               <a:rPr lang="en-US" smtClean="0"/>
-              <a:t>10/9/2019</a:t>
+              <a:t>10/10/2019</a:t>
             </a:fld>
             <a:endParaRPr lang="en-US"/>
           </a:p>
@@ -11954,7 +11960,7 @@
           </a:lstStyle>
           <a:p>
             <a:r>
-              <a:rPr lang="es-ES" smtClean="0"/>
+              <a:rPr lang="es-ES"/>
               <a:t>Haga clic para modificar el estilo de título del patrón</a:t>
             </a:r>
             <a:endParaRPr lang="en-US" dirty="0"/>
@@ -11978,7 +11984,7 @@
           <a:p>
             <a:fld id="{B38D9DF4-9BC4-446F-AB7D-0B53BCD7F2A4}" type="datetimeFigureOut">
               <a:rPr lang="en-US" smtClean="0"/>
-              <a:t>10/9/2019</a:t>
+              <a:t>10/10/2019</a:t>
             </a:fld>
             <a:endParaRPr lang="en-US"/>
           </a:p>
@@ -12078,7 +12084,7 @@
           <a:p>
             <a:fld id="{B38D9DF4-9BC4-446F-AB7D-0B53BCD7F2A4}" type="datetimeFigureOut">
               <a:rPr lang="en-US" smtClean="0"/>
-              <a:t>10/9/2019</a:t>
+              <a:t>10/10/2019</a:t>
             </a:fld>
             <a:endParaRPr lang="en-US"/>
           </a:p>
@@ -13454,7 +13460,7 @@
           </a:lstStyle>
           <a:p>
             <a:r>
-              <a:rPr lang="es-ES" smtClean="0"/>
+              <a:rPr lang="es-ES"/>
               <a:t>Haga clic para modificar el estilo de título del patrón</a:t>
             </a:r>
             <a:endParaRPr lang="en-US" dirty="0"/>
@@ -13483,35 +13489,35 @@
           <a:p>
             <a:pPr lvl="0"/>
             <a:r>
-              <a:rPr lang="es-ES" smtClean="0"/>
+              <a:rPr lang="es-ES"/>
               <a:t>Editar el estilo de texto del patrón</a:t>
             </a:r>
           </a:p>
           <a:p>
             <a:pPr lvl="1"/>
             <a:r>
-              <a:rPr lang="es-ES" smtClean="0"/>
+              <a:rPr lang="es-ES"/>
               <a:t>Segundo nivel</a:t>
             </a:r>
           </a:p>
           <a:p>
             <a:pPr lvl="2"/>
             <a:r>
-              <a:rPr lang="es-ES" smtClean="0"/>
+              <a:rPr lang="es-ES"/>
               <a:t>Tercer nivel</a:t>
             </a:r>
           </a:p>
           <a:p>
             <a:pPr lvl="3"/>
             <a:r>
-              <a:rPr lang="es-ES" smtClean="0"/>
+              <a:rPr lang="es-ES"/>
               <a:t>Cuarto nivel</a:t>
             </a:r>
           </a:p>
           <a:p>
             <a:pPr lvl="4"/>
             <a:r>
-              <a:rPr lang="es-ES" smtClean="0"/>
+              <a:rPr lang="es-ES"/>
               <a:t>Quinto nivel</a:t>
             </a:r>
             <a:endParaRPr lang="en-US" dirty="0"/>
@@ -13581,7 +13587,7 @@
           <a:p>
             <a:pPr lvl="0"/>
             <a:r>
-              <a:rPr lang="es-ES" smtClean="0"/>
+              <a:rPr lang="es-ES"/>
               <a:t>Editar el estilo de texto del patrón</a:t>
             </a:r>
           </a:p>
@@ -13604,7 +13610,7 @@
           <a:p>
             <a:fld id="{B38D9DF4-9BC4-446F-AB7D-0B53BCD7F2A4}" type="datetimeFigureOut">
               <a:rPr lang="en-US" smtClean="0"/>
-              <a:t>10/9/2019</a:t>
+              <a:t>10/10/2019</a:t>
             </a:fld>
             <a:endParaRPr lang="en-US"/>
           </a:p>
@@ -15002,7 +15008,7 @@
           </a:lstStyle>
           <a:p>
             <a:r>
-              <a:rPr lang="es-ES" smtClean="0"/>
+              <a:rPr lang="es-ES"/>
               <a:t>Haga clic en el icono para agregar una imagen</a:t>
             </a:r>
             <a:endParaRPr lang="en-US" dirty="0"/>
@@ -15040,7 +15046,7 @@
           </a:lstStyle>
           <a:p>
             <a:r>
-              <a:rPr lang="es-ES" smtClean="0"/>
+              <a:rPr lang="es-ES"/>
               <a:t>Haga clic para modificar el estilo de título del patrón</a:t>
             </a:r>
             <a:endParaRPr lang="en-US" dirty="0"/>
@@ -15112,7 +15118,7 @@
           <a:p>
             <a:pPr lvl="0"/>
             <a:r>
-              <a:rPr lang="es-ES" smtClean="0"/>
+              <a:rPr lang="es-ES"/>
               <a:t>Editar el estilo de texto del patrón</a:t>
             </a:r>
           </a:p>
@@ -15140,7 +15146,7 @@
           <a:p>
             <a:fld id="{B38D9DF4-9BC4-446F-AB7D-0B53BCD7F2A4}" type="datetimeFigureOut">
               <a:rPr lang="en-US" smtClean="0"/>
-              <a:t>10/9/2019</a:t>
+              <a:t>10/10/2019</a:t>
             </a:fld>
             <a:endParaRPr lang="en-US"/>
           </a:p>
@@ -15259,7 +15265,7 @@
           <a:lstStyle/>
           <a:p>
             <a:r>
-              <a:rPr lang="es-ES" smtClean="0"/>
+              <a:rPr lang="es-ES"/>
               <a:t>Haga clic para modificar el estilo de título del patrón</a:t>
             </a:r>
             <a:endParaRPr lang="en-US" dirty="0"/>
@@ -15390,7 +15396,7 @@
           <a:p>
             <a:fld id="{B38D9DF4-9BC4-446F-AB7D-0B53BCD7F2A4}" type="datetimeFigureOut">
               <a:rPr lang="en-US" smtClean="0"/>
-              <a:t>10/9/2019</a:t>
+              <a:t>10/10/2019</a:t>
             </a:fld>
             <a:endParaRPr lang="en-US"/>
           </a:p>
@@ -15857,7 +15863,7 @@
           <a:lstStyle/>
           <a:p>
             <a:r>
-              <a:rPr lang="es-CO" dirty="0" smtClean="0"/>
+              <a:rPr lang="es-CO" dirty="0"/>
               <a:t>Reflexión Final</a:t>
             </a:r>
             <a:endParaRPr lang="en-US" dirty="0"/>
@@ -15887,7 +15893,7 @@
           <a:lstStyle/>
           <a:p>
             <a:r>
-              <a:rPr lang="es-CO" sz="2400" dirty="0" err="1" smtClean="0"/>
+              <a:rPr lang="es-CO" sz="2400" dirty="0" err="1"/>
               <a:t>BiciGo</a:t>
             </a:r>
             <a:endParaRPr lang="en-US" sz="2400" dirty="0"/>
@@ -15904,13 +15910,6 @@
   <p:clrMapOvr>
     <a:masterClrMapping/>
   </p:clrMapOvr>
-  <p:timing>
-    <p:tnLst>
-      <p:par>
-        <p:cTn id="1" dur="indefinite" restart="never" nodeType="tmRoot"/>
-      </p:par>
-    </p:tnLst>
-  </p:timing>
 </p:sld>
 </file>
 
@@ -15947,7 +15946,7 @@
           <a:lstStyle/>
           <a:p>
             <a:r>
-              <a:rPr lang="es-CO" dirty="0" smtClean="0"/>
+              <a:rPr lang="es-CO" dirty="0"/>
               <a:t>Recursos</a:t>
             </a:r>
             <a:endParaRPr lang="en-US" dirty="0"/>
@@ -15970,15 +15969,15 @@
           <a:lstStyle/>
           <a:p>
             <a:r>
-              <a:rPr lang="es-CO" dirty="0" smtClean="0"/>
+              <a:rPr lang="es-CO" dirty="0"/>
               <a:t>Cuantos con clase </a:t>
             </a:r>
             <a:r>
-              <a:rPr lang="es-CO" dirty="0" err="1" smtClean="0"/>
+              <a:rPr lang="es-CO" dirty="0" err="1"/>
               <a:t>resource</a:t>
             </a:r>
             <a:r>
-              <a:rPr lang="es-CO" dirty="0" smtClean="0"/>
+              <a:rPr lang="es-CO" dirty="0"/>
               <a:t>?</a:t>
             </a:r>
           </a:p>
@@ -15987,21 +15986,21 @@
               <a:buNone/>
             </a:pPr>
             <a:r>
-              <a:rPr lang="es-CO" dirty="0" smtClean="0"/>
-              <a:t>12  (8 sin contar relaciones)</a:t>
+              <a:rPr lang="es-CO" dirty="0"/>
+              <a:t>19  (8 sin contar relaciones)</a:t>
             </a:r>
           </a:p>
           <a:p>
             <a:r>
-              <a:rPr lang="es-CO" dirty="0" smtClean="0"/>
+              <a:rPr lang="es-CO" dirty="0"/>
               <a:t>Cuantos con pruebas de </a:t>
             </a:r>
             <a:r>
-              <a:rPr lang="es-CO" dirty="0" err="1" smtClean="0"/>
+              <a:rPr lang="es-CO" dirty="0" err="1"/>
               <a:t>postman</a:t>
             </a:r>
             <a:r>
-              <a:rPr lang="es-CO" dirty="0" smtClean="0"/>
+              <a:rPr lang="es-CO" dirty="0"/>
               <a:t>?</a:t>
             </a:r>
           </a:p>
@@ -16010,13 +16009,13 @@
               <a:buNone/>
             </a:pPr>
             <a:r>
-              <a:rPr lang="es-CO" dirty="0" smtClean="0"/>
-              <a:t>1 (dependiente)</a:t>
+              <a:rPr lang="es-CO" dirty="0"/>
+              <a:t>2 (dependiente)</a:t>
             </a:r>
           </a:p>
           <a:p>
             <a:r>
-              <a:rPr lang="es-CO" dirty="0" smtClean="0"/>
+              <a:rPr lang="es-CO" dirty="0"/>
               <a:t>Cuantos con pruebas de lógica?</a:t>
             </a:r>
           </a:p>
@@ -16025,13 +16024,13 @@
               <a:buNone/>
             </a:pPr>
             <a:r>
-              <a:rPr lang="es-CO" dirty="0" smtClean="0"/>
-              <a:t>12 (20 en total)</a:t>
+              <a:rPr lang="es-CO" dirty="0"/>
+              <a:t>12 (21 en total)</a:t>
             </a:r>
           </a:p>
           <a:p>
             <a:r>
-              <a:rPr lang="es-CO" dirty="0" smtClean="0"/>
+              <a:rPr lang="es-CO" dirty="0"/>
               <a:t>Cuantos con pruebas de persistencia?</a:t>
             </a:r>
           </a:p>
@@ -16040,7 +16039,7 @@
               <a:buNone/>
             </a:pPr>
             <a:r>
-              <a:rPr lang="es-CO" dirty="0" smtClean="0"/>
+              <a:rPr lang="es-CO" dirty="0"/>
               <a:t>8</a:t>
             </a:r>
             <a:endParaRPr lang="en-US" dirty="0"/>
@@ -16057,13 +16056,6 @@
   <p:clrMapOvr>
     <a:masterClrMapping/>
   </p:clrMapOvr>
-  <p:timing>
-    <p:tnLst>
-      <p:par>
-        <p:cTn id="1" dur="indefinite" restart="never" nodeType="tmRoot"/>
-      </p:par>
-    </p:tnLst>
-  </p:timing>
 </p:sld>
 </file>
 
@@ -16100,7 +16092,7 @@
           <a:lstStyle/>
           <a:p>
             <a:r>
-              <a:rPr lang="es-CO" dirty="0" smtClean="0"/>
+              <a:rPr lang="es-CO" dirty="0"/>
               <a:t>Jenkins</a:t>
             </a:r>
             <a:endParaRPr lang="en-US" dirty="0"/>
@@ -16123,7 +16115,7 @@
           <a:lstStyle/>
           <a:p>
             <a:r>
-              <a:rPr lang="es-CO" dirty="0" smtClean="0"/>
+              <a:rPr lang="es-CO" dirty="0"/>
               <a:t>Historial:</a:t>
             </a:r>
           </a:p>
@@ -16132,15 +16124,15 @@
               <a:buNone/>
             </a:pPr>
             <a:r>
-              <a:rPr lang="es-CO" dirty="0" smtClean="0"/>
-              <a:t>45 iteraciones con </a:t>
+              <a:rPr lang="es-CO" dirty="0"/>
+              <a:t>48 iteraciones con </a:t>
             </a:r>
             <a:r>
-              <a:rPr lang="es-CO" dirty="0" err="1" smtClean="0"/>
+              <a:rPr lang="es-CO" dirty="0" err="1"/>
               <a:t>tests</a:t>
             </a:r>
             <a:r>
-              <a:rPr lang="es-CO" dirty="0" smtClean="0"/>
+              <a:rPr lang="es-CO" dirty="0"/>
               <a:t> mayormente saludables</a:t>
             </a:r>
           </a:p>
@@ -16149,7 +16141,7 @@
               <a:buNone/>
             </a:pPr>
             <a:r>
-              <a:rPr lang="es-CO" dirty="0" smtClean="0"/>
+              <a:rPr lang="es-CO" dirty="0"/>
               <a:t>Protocolos</a:t>
             </a:r>
           </a:p>
@@ -16157,11 +16149,11 @@
             <a:pPr marL="0" indent="0">
               <a:buNone/>
             </a:pPr>
-            <a:endParaRPr lang="es-CO" dirty="0" smtClean="0"/>
+            <a:endParaRPr lang="es-CO" dirty="0"/>
           </a:p>
           <a:p>
             <a:r>
-              <a:rPr lang="es-CO" dirty="0" smtClean="0"/>
+              <a:rPr lang="es-CO" dirty="0"/>
               <a:t>Actualidad:</a:t>
             </a:r>
           </a:p>
@@ -16170,16 +16162,16 @@
               <a:buNone/>
             </a:pPr>
             <a:r>
-              <a:rPr lang="es-CO" dirty="0" smtClean="0"/>
-              <a:t>141 </a:t>
+              <a:rPr lang="es-CO" dirty="0"/>
+              <a:t>140 </a:t>
             </a:r>
             <a:r>
-              <a:rPr lang="es-CO" dirty="0" err="1" smtClean="0"/>
+              <a:rPr lang="es-CO" dirty="0" err="1"/>
               <a:t>tests</a:t>
             </a:r>
             <a:r>
-              <a:rPr lang="es-CO" dirty="0" smtClean="0"/>
-              <a:t> / 2 fallidos</a:t>
+              <a:rPr lang="es-CO" dirty="0"/>
+              <a:t> / 1 fallidos</a:t>
             </a:r>
           </a:p>
           <a:p>
@@ -16187,7 +16179,7 @@
               <a:buNone/>
             </a:pPr>
             <a:r>
-              <a:rPr lang="es-CO" dirty="0" smtClean="0"/>
+              <a:rPr lang="es-CO" dirty="0"/>
               <a:t>Sol despejado</a:t>
             </a:r>
             <a:endParaRPr lang="en-US" dirty="0"/>
@@ -16204,13 +16196,6 @@
   <p:clrMapOvr>
     <a:masterClrMapping/>
   </p:clrMapOvr>
-  <p:timing>
-    <p:tnLst>
-      <p:par>
-        <p:cTn id="1" dur="indefinite" restart="never" nodeType="tmRoot"/>
-      </p:par>
-    </p:tnLst>
-  </p:timing>
 </p:sld>
 </file>
 
@@ -16247,7 +16232,7 @@
           <a:lstStyle/>
           <a:p>
             <a:r>
-              <a:rPr lang="es-CO" dirty="0" err="1" smtClean="0"/>
+              <a:rPr lang="es-CO" dirty="0" err="1"/>
               <a:t>Github</a:t>
             </a:r>
             <a:endParaRPr lang="en-US" dirty="0"/>
@@ -16270,55 +16255,47 @@
           <a:lstStyle/>
           <a:p>
             <a:r>
-              <a:rPr lang="es-CO" dirty="0" smtClean="0"/>
+              <a:rPr lang="es-CO" dirty="0"/>
               <a:t>27 </a:t>
             </a:r>
             <a:r>
-              <a:rPr lang="es-CO" dirty="0" err="1" smtClean="0"/>
+              <a:rPr lang="es-CO" dirty="0" err="1"/>
               <a:t>issues</a:t>
             </a:r>
-            <a:endParaRPr lang="es-CO" dirty="0" smtClean="0"/>
+            <a:endParaRPr lang="es-CO" dirty="0"/>
           </a:p>
           <a:p>
             <a:r>
-              <a:rPr lang="es-CO" dirty="0" err="1" smtClean="0"/>
+              <a:rPr lang="es-CO" dirty="0" err="1"/>
               <a:t>Resources</a:t>
             </a:r>
             <a:r>
-              <a:rPr lang="es-CO" dirty="0" smtClean="0"/>
+              <a:rPr lang="es-CO" dirty="0"/>
               <a:t> – Revisar nulidades</a:t>
             </a:r>
           </a:p>
           <a:p>
             <a:r>
-              <a:rPr lang="es-CO" dirty="0" err="1" smtClean="0"/>
+              <a:rPr lang="es-CO" dirty="0" err="1"/>
               <a:t>DTOs</a:t>
             </a:r>
             <a:r>
-              <a:rPr lang="es-CO" dirty="0" smtClean="0"/>
+              <a:rPr lang="es-CO" dirty="0"/>
               <a:t> – Datos </a:t>
             </a:r>
             <a:r>
-              <a:rPr lang="es-CO" dirty="0" err="1" smtClean="0"/>
+              <a:rPr lang="es-CO" dirty="0" err="1"/>
               <a:t>serializables</a:t>
             </a:r>
             <a:r>
-              <a:rPr lang="es-CO" dirty="0" smtClean="0"/>
+              <a:rPr lang="es-CO" dirty="0"/>
               <a:t> y constructores</a:t>
             </a:r>
           </a:p>
           <a:p>
             <a:r>
-              <a:rPr lang="es-CO" dirty="0" smtClean="0"/>
-              <a:t>Entidades - </a:t>
-            </a:r>
-            <a:r>
               <a:rPr lang="es-CO" dirty="0"/>
-              <a:t>C</a:t>
-            </a:r>
-            <a:r>
-              <a:rPr lang="es-CO" dirty="0" smtClean="0"/>
-              <a:t>ampos primitivos</a:t>
+              <a:t>Entidades - Campos primitivos</a:t>
             </a:r>
             <a:endParaRPr lang="en-US" dirty="0"/>
           </a:p>
@@ -16334,13 +16311,819 @@
   <p:clrMapOvr>
     <a:masterClrMapping/>
   </p:clrMapOvr>
-  <p:timing>
-    <p:tnLst>
-      <p:par>
-        <p:cTn id="1" dur="indefinite" restart="never" nodeType="tmRoot"/>
-      </p:par>
-    </p:tnLst>
-  </p:timing>
+</p:sld>
+</file>
+
+<file path=ppt/slides/slide5.xml><?xml version="1.0" encoding="utf-8"?>
+<p:sld xmlns:a="http://schemas.openxmlformats.org/drawingml/2006/main" xmlns:r="http://schemas.openxmlformats.org/officeDocument/2006/relationships" xmlns:p="http://schemas.openxmlformats.org/presentationml/2006/main">
+  <p:cSld>
+    <p:spTree>
+      <p:nvGrpSpPr>
+        <p:cNvPr id="1" name=""/>
+        <p:cNvGrpSpPr/>
+        <p:nvPr/>
+      </p:nvGrpSpPr>
+      <p:grpSpPr>
+        <a:xfrm>
+          <a:off x="0" y="0"/>
+          <a:ext cx="0" cy="0"/>
+          <a:chOff x="0" y="0"/>
+          <a:chExt cx="0" cy="0"/>
+        </a:xfrm>
+      </p:grpSpPr>
+      <p:graphicFrame>
+        <p:nvGraphicFramePr>
+          <p:cNvPr id="4" name="Tabla 8">
+            <a:extLst>
+              <a:ext uri="{FF2B5EF4-FFF2-40B4-BE49-F238E27FC236}">
+                <a16:creationId xmlns:a16="http://schemas.microsoft.com/office/drawing/2014/main" id="{C403DE3A-25A1-45FF-8FC0-2D9CBAECD5F7}"/>
+              </a:ext>
+            </a:extLst>
+          </p:cNvPr>
+          <p:cNvGraphicFramePr>
+            <a:graphicFrameLocks noGrp="1"/>
+          </p:cNvGraphicFramePr>
+          <p:nvPr>
+            <p:extLst>
+              <p:ext uri="{D42A27DB-BD31-4B8C-83A1-F6EECF244321}">
+                <p14:modId xmlns:p14="http://schemas.microsoft.com/office/powerpoint/2010/main" val="1023662688"/>
+              </p:ext>
+            </p:extLst>
+          </p:nvPr>
+        </p:nvGraphicFramePr>
+        <p:xfrm>
+          <a:off x="0" y="1262725"/>
+          <a:ext cx="7670798" cy="4358736"/>
+        </p:xfrm>
+        <a:graphic>
+          <a:graphicData uri="http://schemas.openxmlformats.org/drawingml/2006/table">
+            <a:tbl>
+              <a:tblPr firstRow="1" bandRow="1">
+                <a:tableStyleId>{5C22544A-7EE6-4342-B048-85BDC9FD1C3A}</a:tableStyleId>
+              </a:tblPr>
+              <a:tblGrid>
+                <a:gridCol w="1737403">
+                  <a:extLst>
+                    <a:ext uri="{9D8B030D-6E8A-4147-A177-3AD203B41FA5}">
+                      <a16:colId xmlns:a16="http://schemas.microsoft.com/office/drawing/2014/main" val="3050274688"/>
+                    </a:ext>
+                  </a:extLst>
+                </a:gridCol>
+                <a:gridCol w="1234758">
+                  <a:extLst>
+                    <a:ext uri="{9D8B030D-6E8A-4147-A177-3AD203B41FA5}">
+                      <a16:colId xmlns:a16="http://schemas.microsoft.com/office/drawing/2014/main" val="3354621727"/>
+                    </a:ext>
+                  </a:extLst>
+                </a:gridCol>
+                <a:gridCol w="1081779">
+                  <a:extLst>
+                    <a:ext uri="{9D8B030D-6E8A-4147-A177-3AD203B41FA5}">
+                      <a16:colId xmlns:a16="http://schemas.microsoft.com/office/drawing/2014/main" val="2984787927"/>
+                    </a:ext>
+                  </a:extLst>
+                </a:gridCol>
+                <a:gridCol w="983436">
+                  <a:extLst>
+                    <a:ext uri="{9D8B030D-6E8A-4147-A177-3AD203B41FA5}">
+                      <a16:colId xmlns:a16="http://schemas.microsoft.com/office/drawing/2014/main" val="385603891"/>
+                    </a:ext>
+                  </a:extLst>
+                </a:gridCol>
+                <a:gridCol w="1245685">
+                  <a:extLst>
+                    <a:ext uri="{9D8B030D-6E8A-4147-A177-3AD203B41FA5}">
+                      <a16:colId xmlns:a16="http://schemas.microsoft.com/office/drawing/2014/main" val="1156773756"/>
+                    </a:ext>
+                  </a:extLst>
+                </a:gridCol>
+                <a:gridCol w="1387737">
+                  <a:extLst>
+                    <a:ext uri="{9D8B030D-6E8A-4147-A177-3AD203B41FA5}">
+                      <a16:colId xmlns:a16="http://schemas.microsoft.com/office/drawing/2014/main" val="919962701"/>
+                    </a:ext>
+                  </a:extLst>
+                </a:gridCol>
+              </a:tblGrid>
+              <a:tr h="907334">
+                <a:tc>
+                  <a:txBody>
+                    <a:bodyPr/>
+                    <a:lstStyle/>
+                    <a:p>
+                      <a:endParaRPr lang="en-US"/>
+                    </a:p>
+                  </a:txBody>
+                  <a:tcPr/>
+                </a:tc>
+                <a:tc>
+                  <a:txBody>
+                    <a:bodyPr/>
+                    <a:lstStyle/>
+                    <a:p>
+                      <a:r>
+                        <a:rPr lang="en-US" dirty="0" err="1"/>
+                        <a:t>Tareas</a:t>
+                      </a:r>
+                      <a:r>
+                        <a:rPr lang="en-US" dirty="0"/>
+                        <a:t> </a:t>
+                      </a:r>
+                      <a:r>
+                        <a:rPr lang="en-US" dirty="0" err="1"/>
+                        <a:t>planeadas</a:t>
+                      </a:r>
+                      <a:endParaRPr lang="en-US" dirty="0"/>
+                    </a:p>
+                  </a:txBody>
+                  <a:tcPr/>
+                </a:tc>
+                <a:tc>
+                  <a:txBody>
+                    <a:bodyPr/>
+                    <a:lstStyle/>
+                    <a:p>
+                      <a:r>
+                        <a:rPr lang="en-US" dirty="0" err="1"/>
+                        <a:t>Tareas</a:t>
+                      </a:r>
+                      <a:r>
+                        <a:rPr lang="en-US" dirty="0"/>
+                        <a:t> </a:t>
+                      </a:r>
+                      <a:r>
+                        <a:rPr lang="en-US" dirty="0" err="1"/>
+                        <a:t>cerradas</a:t>
+                      </a:r>
+                      <a:endParaRPr lang="en-US" dirty="0"/>
+                    </a:p>
+                  </a:txBody>
+                  <a:tcPr/>
+                </a:tc>
+                <a:tc>
+                  <a:txBody>
+                    <a:bodyPr/>
+                    <a:lstStyle/>
+                    <a:p>
+                      <a:r>
+                        <a:rPr lang="en-US" dirty="0" err="1"/>
+                        <a:t>Tareas</a:t>
+                      </a:r>
+                      <a:r>
+                        <a:rPr lang="en-US" dirty="0"/>
+                        <a:t> sin </a:t>
+                      </a:r>
+                      <a:r>
+                        <a:rPr lang="en-US" dirty="0" err="1"/>
+                        <a:t>iniciar</a:t>
+                      </a:r>
+                      <a:endParaRPr lang="en-US" dirty="0"/>
+                    </a:p>
+                  </a:txBody>
+                  <a:tcPr/>
+                </a:tc>
+                <a:tc>
+                  <a:txBody>
+                    <a:bodyPr/>
+                    <a:lstStyle/>
+                    <a:p>
+                      <a:r>
+                        <a:rPr lang="en-US" dirty="0" err="1"/>
+                        <a:t>Tareas</a:t>
+                      </a:r>
+                      <a:r>
+                        <a:rPr lang="en-US" dirty="0"/>
+                        <a:t> con log de </a:t>
+                      </a:r>
+                      <a:r>
+                        <a:rPr lang="en-US" dirty="0" err="1"/>
+                        <a:t>tiempo</a:t>
+                      </a:r>
+                      <a:endParaRPr lang="en-US" dirty="0"/>
+                    </a:p>
+                  </a:txBody>
+                  <a:tcPr/>
+                </a:tc>
+                <a:tc>
+                  <a:txBody>
+                    <a:bodyPr/>
+                    <a:lstStyle/>
+                    <a:p>
+                      <a:r>
+                        <a:rPr lang="en-US" dirty="0" err="1"/>
+                        <a:t>Estimados</a:t>
+                      </a:r>
+                      <a:r>
+                        <a:rPr lang="en-US" dirty="0"/>
+                        <a:t> vs </a:t>
+                      </a:r>
+                      <a:r>
+                        <a:rPr lang="en-US" dirty="0" err="1"/>
+                        <a:t>registrados</a:t>
+                      </a:r>
+                      <a:endParaRPr lang="en-US" dirty="0"/>
+                    </a:p>
+                  </a:txBody>
+                  <a:tcPr/>
+                </a:tc>
+                <a:extLst>
+                  <a:ext uri="{0D108BD9-81ED-4DB2-BD59-A6C34878D82A}">
+                    <a16:rowId xmlns:a16="http://schemas.microsoft.com/office/drawing/2014/main" val="2186121703"/>
+                  </a:ext>
+                </a:extLst>
+              </a:tr>
+              <a:tr h="417960">
+                <a:tc>
+                  <a:txBody>
+                    <a:bodyPr/>
+                    <a:lstStyle/>
+                    <a:p>
+                      <a:r>
+                        <a:rPr lang="en-US" dirty="0"/>
+                        <a:t>Juan Diego R.</a:t>
+                      </a:r>
+                    </a:p>
+                  </a:txBody>
+                  <a:tcPr/>
+                </a:tc>
+                <a:tc>
+                  <a:txBody>
+                    <a:bodyPr/>
+                    <a:lstStyle/>
+                    <a:p>
+                      <a:endParaRPr lang="en-US" dirty="0"/>
+                    </a:p>
+                  </a:txBody>
+                  <a:tcPr/>
+                </a:tc>
+                <a:tc>
+                  <a:txBody>
+                    <a:bodyPr/>
+                    <a:lstStyle/>
+                    <a:p>
+                      <a:endParaRPr lang="en-US"/>
+                    </a:p>
+                  </a:txBody>
+                  <a:tcPr/>
+                </a:tc>
+                <a:tc>
+                  <a:txBody>
+                    <a:bodyPr/>
+                    <a:lstStyle/>
+                    <a:p>
+                      <a:endParaRPr lang="en-US"/>
+                    </a:p>
+                  </a:txBody>
+                  <a:tcPr/>
+                </a:tc>
+                <a:tc>
+                  <a:txBody>
+                    <a:bodyPr/>
+                    <a:lstStyle/>
+                    <a:p>
+                      <a:endParaRPr lang="en-US"/>
+                    </a:p>
+                  </a:txBody>
+                  <a:tcPr/>
+                </a:tc>
+                <a:tc>
+                  <a:txBody>
+                    <a:bodyPr/>
+                    <a:lstStyle/>
+                    <a:p>
+                      <a:endParaRPr lang="en-US"/>
+                    </a:p>
+                  </a:txBody>
+                  <a:tcPr/>
+                </a:tc>
+                <a:extLst>
+                  <a:ext uri="{0D108BD9-81ED-4DB2-BD59-A6C34878D82A}">
+                    <a16:rowId xmlns:a16="http://schemas.microsoft.com/office/drawing/2014/main" val="1728090614"/>
+                  </a:ext>
+                </a:extLst>
+              </a:tr>
+              <a:tr h="367974">
+                <a:tc>
+                  <a:txBody>
+                    <a:bodyPr/>
+                    <a:lstStyle/>
+                    <a:p>
+                      <a:r>
+                        <a:rPr lang="en-US" dirty="0"/>
+                        <a:t>Oscar Julian C.</a:t>
+                      </a:r>
+                    </a:p>
+                  </a:txBody>
+                  <a:tcPr/>
+                </a:tc>
+                <a:tc>
+                  <a:txBody>
+                    <a:bodyPr/>
+                    <a:lstStyle/>
+                    <a:p>
+                      <a:r>
+                        <a:rPr lang="en-US" dirty="0"/>
+                        <a:t>19</a:t>
+                      </a:r>
+                    </a:p>
+                  </a:txBody>
+                  <a:tcPr/>
+                </a:tc>
+                <a:tc>
+                  <a:txBody>
+                    <a:bodyPr/>
+                    <a:lstStyle/>
+                    <a:p>
+                      <a:r>
+                        <a:rPr lang="en-US" dirty="0"/>
+                        <a:t>17</a:t>
+                      </a:r>
+                    </a:p>
+                  </a:txBody>
+                  <a:tcPr/>
+                </a:tc>
+                <a:tc>
+                  <a:txBody>
+                    <a:bodyPr/>
+                    <a:lstStyle/>
+                    <a:p>
+                      <a:r>
+                        <a:rPr lang="en-US" dirty="0"/>
+                        <a:t>2</a:t>
+                      </a:r>
+                    </a:p>
+                  </a:txBody>
+                  <a:tcPr/>
+                </a:tc>
+                <a:tc>
+                  <a:txBody>
+                    <a:bodyPr/>
+                    <a:lstStyle/>
+                    <a:p>
+                      <a:r>
+                        <a:rPr lang="en-US" dirty="0"/>
+                        <a:t>17</a:t>
+                      </a:r>
+                    </a:p>
+                  </a:txBody>
+                  <a:tcPr/>
+                </a:tc>
+                <a:tc>
+                  <a:txBody>
+                    <a:bodyPr/>
+                    <a:lstStyle/>
+                    <a:p>
+                      <a:endParaRPr lang="en-US"/>
+                    </a:p>
+                  </a:txBody>
+                  <a:tcPr/>
+                </a:tc>
+                <a:extLst>
+                  <a:ext uri="{0D108BD9-81ED-4DB2-BD59-A6C34878D82A}">
+                    <a16:rowId xmlns:a16="http://schemas.microsoft.com/office/drawing/2014/main" val="1121502020"/>
+                  </a:ext>
+                </a:extLst>
+              </a:tr>
+              <a:tr h="367974">
+                <a:tc>
+                  <a:txBody>
+                    <a:bodyPr/>
+                    <a:lstStyle/>
+                    <a:p>
+                      <a:r>
+                        <a:rPr lang="en-US" dirty="0"/>
+                        <a:t>Maria Clara N.</a:t>
+                      </a:r>
+                    </a:p>
+                  </a:txBody>
+                  <a:tcPr/>
+                </a:tc>
+                <a:tc>
+                  <a:txBody>
+                    <a:bodyPr/>
+                    <a:lstStyle/>
+                    <a:p>
+                      <a:endParaRPr lang="en-US"/>
+                    </a:p>
+                  </a:txBody>
+                  <a:tcPr/>
+                </a:tc>
+                <a:tc>
+                  <a:txBody>
+                    <a:bodyPr/>
+                    <a:lstStyle/>
+                    <a:p>
+                      <a:endParaRPr lang="en-US" dirty="0"/>
+                    </a:p>
+                  </a:txBody>
+                  <a:tcPr/>
+                </a:tc>
+                <a:tc>
+                  <a:txBody>
+                    <a:bodyPr/>
+                    <a:lstStyle/>
+                    <a:p>
+                      <a:endParaRPr lang="en-US"/>
+                    </a:p>
+                  </a:txBody>
+                  <a:tcPr/>
+                </a:tc>
+                <a:tc>
+                  <a:txBody>
+                    <a:bodyPr/>
+                    <a:lstStyle/>
+                    <a:p>
+                      <a:endParaRPr lang="en-US"/>
+                    </a:p>
+                  </a:txBody>
+                  <a:tcPr/>
+                </a:tc>
+                <a:tc>
+                  <a:txBody>
+                    <a:bodyPr/>
+                    <a:lstStyle/>
+                    <a:p>
+                      <a:endParaRPr lang="en-US" dirty="0"/>
+                    </a:p>
+                  </a:txBody>
+                  <a:tcPr/>
+                </a:tc>
+                <a:extLst>
+                  <a:ext uri="{0D108BD9-81ED-4DB2-BD59-A6C34878D82A}">
+                    <a16:rowId xmlns:a16="http://schemas.microsoft.com/office/drawing/2014/main" val="4188434274"/>
+                  </a:ext>
+                </a:extLst>
+              </a:tr>
+              <a:tr h="367974">
+                <a:tc>
+                  <a:txBody>
+                    <a:bodyPr/>
+                    <a:lstStyle/>
+                    <a:p>
+                      <a:r>
+                        <a:rPr lang="en-US" dirty="0"/>
+                        <a:t>Juan Sebastian G</a:t>
+                      </a:r>
+                    </a:p>
+                  </a:txBody>
+                  <a:tcPr/>
+                </a:tc>
+                <a:tc>
+                  <a:txBody>
+                    <a:bodyPr/>
+                    <a:lstStyle/>
+                    <a:p>
+                      <a:endParaRPr lang="en-US"/>
+                    </a:p>
+                  </a:txBody>
+                  <a:tcPr/>
+                </a:tc>
+                <a:tc>
+                  <a:txBody>
+                    <a:bodyPr/>
+                    <a:lstStyle/>
+                    <a:p>
+                      <a:endParaRPr lang="en-US" dirty="0"/>
+                    </a:p>
+                  </a:txBody>
+                  <a:tcPr/>
+                </a:tc>
+                <a:tc>
+                  <a:txBody>
+                    <a:bodyPr/>
+                    <a:lstStyle/>
+                    <a:p>
+                      <a:endParaRPr lang="en-US"/>
+                    </a:p>
+                  </a:txBody>
+                  <a:tcPr/>
+                </a:tc>
+                <a:tc>
+                  <a:txBody>
+                    <a:bodyPr/>
+                    <a:lstStyle/>
+                    <a:p>
+                      <a:endParaRPr lang="en-US"/>
+                    </a:p>
+                  </a:txBody>
+                  <a:tcPr/>
+                </a:tc>
+                <a:tc>
+                  <a:txBody>
+                    <a:bodyPr/>
+                    <a:lstStyle/>
+                    <a:p>
+                      <a:endParaRPr lang="en-US" dirty="0"/>
+                    </a:p>
+                  </a:txBody>
+                  <a:tcPr/>
+                </a:tc>
+                <a:extLst>
+                  <a:ext uri="{0D108BD9-81ED-4DB2-BD59-A6C34878D82A}">
+                    <a16:rowId xmlns:a16="http://schemas.microsoft.com/office/drawing/2014/main" val="224523784"/>
+                  </a:ext>
+                </a:extLst>
+              </a:tr>
+              <a:tr h="367974">
+                <a:tc>
+                  <a:txBody>
+                    <a:bodyPr/>
+                    <a:lstStyle/>
+                    <a:p>
+                      <a:r>
+                        <a:rPr lang="en-US" dirty="0" err="1"/>
+                        <a:t>Jhuliana</a:t>
+                      </a:r>
+                      <a:r>
+                        <a:rPr lang="en-US" dirty="0"/>
+                        <a:t> </a:t>
+                      </a:r>
+                      <a:r>
+                        <a:rPr lang="en-US" dirty="0" err="1"/>
+                        <a:t>Jhoel</a:t>
+                      </a:r>
+                      <a:r>
+                        <a:rPr lang="en-US" dirty="0"/>
+                        <a:t> B.</a:t>
+                      </a:r>
+                    </a:p>
+                  </a:txBody>
+                  <a:tcPr/>
+                </a:tc>
+                <a:tc>
+                  <a:txBody>
+                    <a:bodyPr/>
+                    <a:lstStyle/>
+                    <a:p>
+                      <a:endParaRPr lang="en-US"/>
+                    </a:p>
+                  </a:txBody>
+                  <a:tcPr/>
+                </a:tc>
+                <a:tc>
+                  <a:txBody>
+                    <a:bodyPr/>
+                    <a:lstStyle/>
+                    <a:p>
+                      <a:endParaRPr lang="en-US"/>
+                    </a:p>
+                  </a:txBody>
+                  <a:tcPr/>
+                </a:tc>
+                <a:tc>
+                  <a:txBody>
+                    <a:bodyPr/>
+                    <a:lstStyle/>
+                    <a:p>
+                      <a:endParaRPr lang="en-US"/>
+                    </a:p>
+                  </a:txBody>
+                  <a:tcPr/>
+                </a:tc>
+                <a:tc>
+                  <a:txBody>
+                    <a:bodyPr/>
+                    <a:lstStyle/>
+                    <a:p>
+                      <a:endParaRPr lang="en-US"/>
+                    </a:p>
+                  </a:txBody>
+                  <a:tcPr/>
+                </a:tc>
+                <a:tc>
+                  <a:txBody>
+                    <a:bodyPr/>
+                    <a:lstStyle/>
+                    <a:p>
+                      <a:endParaRPr lang="en-US" dirty="0"/>
+                    </a:p>
+                  </a:txBody>
+                  <a:tcPr/>
+                </a:tc>
+                <a:extLst>
+                  <a:ext uri="{0D108BD9-81ED-4DB2-BD59-A6C34878D82A}">
+                    <a16:rowId xmlns:a16="http://schemas.microsoft.com/office/drawing/2014/main" val="2522251948"/>
+                  </a:ext>
+                </a:extLst>
+              </a:tr>
+              <a:tr h="367974">
+                <a:tc>
+                  <a:txBody>
+                    <a:bodyPr/>
+                    <a:lstStyle/>
+                    <a:p>
+                      <a:r>
+                        <a:rPr lang="en-US" dirty="0"/>
+                        <a:t>Michel S.</a:t>
+                      </a:r>
+                    </a:p>
+                  </a:txBody>
+                  <a:tcPr/>
+                </a:tc>
+                <a:tc>
+                  <a:txBody>
+                    <a:bodyPr/>
+                    <a:lstStyle/>
+                    <a:p>
+                      <a:endParaRPr lang="en-US"/>
+                    </a:p>
+                  </a:txBody>
+                  <a:tcPr/>
+                </a:tc>
+                <a:tc>
+                  <a:txBody>
+                    <a:bodyPr/>
+                    <a:lstStyle/>
+                    <a:p>
+                      <a:endParaRPr lang="en-US"/>
+                    </a:p>
+                  </a:txBody>
+                  <a:tcPr/>
+                </a:tc>
+                <a:tc>
+                  <a:txBody>
+                    <a:bodyPr/>
+                    <a:lstStyle/>
+                    <a:p>
+                      <a:endParaRPr lang="en-US"/>
+                    </a:p>
+                  </a:txBody>
+                  <a:tcPr/>
+                </a:tc>
+                <a:tc>
+                  <a:txBody>
+                    <a:bodyPr/>
+                    <a:lstStyle/>
+                    <a:p>
+                      <a:endParaRPr lang="en-US"/>
+                    </a:p>
+                  </a:txBody>
+                  <a:tcPr/>
+                </a:tc>
+                <a:tc>
+                  <a:txBody>
+                    <a:bodyPr/>
+                    <a:lstStyle/>
+                    <a:p>
+                      <a:endParaRPr lang="en-US"/>
+                    </a:p>
+                  </a:txBody>
+                  <a:tcPr/>
+                </a:tc>
+                <a:extLst>
+                  <a:ext uri="{0D108BD9-81ED-4DB2-BD59-A6C34878D82A}">
+                    <a16:rowId xmlns:a16="http://schemas.microsoft.com/office/drawing/2014/main" val="4059802151"/>
+                  </a:ext>
+                </a:extLst>
+              </a:tr>
+              <a:tr h="367974">
+                <a:tc>
+                  <a:txBody>
+                    <a:bodyPr/>
+                    <a:lstStyle/>
+                    <a:p>
+                      <a:r>
+                        <a:rPr lang="en-US" dirty="0"/>
+                        <a:t>Grupo</a:t>
+                      </a:r>
+                    </a:p>
+                  </a:txBody>
+                  <a:tcPr/>
+                </a:tc>
+                <a:tc>
+                  <a:txBody>
+                    <a:bodyPr/>
+                    <a:lstStyle/>
+                    <a:p>
+                      <a:r>
+                        <a:rPr lang="en-US" dirty="0"/>
+                        <a:t>69</a:t>
+                      </a:r>
+                    </a:p>
+                  </a:txBody>
+                  <a:tcPr/>
+                </a:tc>
+                <a:tc>
+                  <a:txBody>
+                    <a:bodyPr/>
+                    <a:lstStyle/>
+                    <a:p>
+                      <a:r>
+                        <a:rPr lang="en-US" dirty="0"/>
+                        <a:t>58</a:t>
+                      </a:r>
+                    </a:p>
+                  </a:txBody>
+                  <a:tcPr/>
+                </a:tc>
+                <a:tc>
+                  <a:txBody>
+                    <a:bodyPr/>
+                    <a:lstStyle/>
+                    <a:p>
+                      <a:r>
+                        <a:rPr lang="en-US" dirty="0"/>
+                        <a:t>11</a:t>
+                      </a:r>
+                    </a:p>
+                  </a:txBody>
+                  <a:tcPr/>
+                </a:tc>
+                <a:tc>
+                  <a:txBody>
+                    <a:bodyPr/>
+                    <a:lstStyle/>
+                    <a:p>
+                      <a:endParaRPr lang="en-US" dirty="0"/>
+                    </a:p>
+                  </a:txBody>
+                  <a:tcPr/>
+                </a:tc>
+                <a:tc>
+                  <a:txBody>
+                    <a:bodyPr/>
+                    <a:lstStyle/>
+                    <a:p>
+                      <a:endParaRPr lang="en-US" dirty="0"/>
+                    </a:p>
+                  </a:txBody>
+                  <a:tcPr/>
+                </a:tc>
+                <a:extLst>
+                  <a:ext uri="{0D108BD9-81ED-4DB2-BD59-A6C34878D82A}">
+                    <a16:rowId xmlns:a16="http://schemas.microsoft.com/office/drawing/2014/main" val="4143491127"/>
+                  </a:ext>
+                </a:extLst>
+              </a:tr>
+            </a:tbl>
+          </a:graphicData>
+        </a:graphic>
+      </p:graphicFrame>
+      <p:sp>
+        <p:nvSpPr>
+          <p:cNvPr id="5" name="Título 1">
+            <a:extLst>
+              <a:ext uri="{FF2B5EF4-FFF2-40B4-BE49-F238E27FC236}">
+                <a16:creationId xmlns:a16="http://schemas.microsoft.com/office/drawing/2014/main" id="{1914E636-F307-4C68-A4DB-04AA69B0906F}"/>
+              </a:ext>
+            </a:extLst>
+          </p:cNvPr>
+          <p:cNvSpPr txBox="1">
+            <a:spLocks/>
+          </p:cNvSpPr>
+          <p:nvPr/>
+        </p:nvSpPr>
+        <p:spPr>
+          <a:xfrm rot="16200000">
+            <a:off x="7886332" y="2213872"/>
+            <a:ext cx="3498979" cy="2456442"/>
+          </a:xfrm>
+          <a:prstGeom prst="rect">
+            <a:avLst/>
+          </a:prstGeom>
+        </p:spPr>
+        <p:txBody>
+          <a:bodyPr vert="eaVert" lIns="228600" tIns="228600" rIns="228600" bIns="228600" rtlCol="0" anchor="ctr">
+            <a:normAutofit/>
+          </a:bodyPr>
+          <a:lstStyle>
+            <a:lvl1pPr algn="l" defTabSz="914400" rtl="0" eaLnBrk="1" latinLnBrk="0" hangingPunct="1">
+              <a:lnSpc>
+                <a:spcPct val="80000"/>
+              </a:lnSpc>
+              <a:spcBef>
+                <a:spcPct val="0"/>
+              </a:spcBef>
+              <a:buNone/>
+              <a:defRPr sz="4000" b="0" i="0" kern="1200" cap="none" spc="-150">
+                <a:solidFill>
+                  <a:srgbClr val="FFFEFF"/>
+                </a:solidFill>
+                <a:effectLst/>
+                <a:latin typeface="+mj-lt"/>
+                <a:ea typeface="+mj-ea"/>
+                <a:cs typeface="+mj-cs"/>
+              </a:defRPr>
+            </a:lvl1pPr>
+          </a:lstStyle>
+          <a:p>
+            <a:r>
+              <a:rPr lang="en-US" dirty="0"/>
+              <a:t>Teamwork</a:t>
+            </a:r>
+          </a:p>
+        </p:txBody>
+      </p:sp>
+    </p:spTree>
+    <p:extLst>
+      <p:ext uri="{BB962C8B-B14F-4D97-AF65-F5344CB8AC3E}">
+        <p14:creationId xmlns:p14="http://schemas.microsoft.com/office/powerpoint/2010/main" val="2393378973"/>
+      </p:ext>
+    </p:extLst>
+  </p:cSld>
+  <p:clrMapOvr>
+    <a:masterClrMapping/>
+  </p:clrMapOvr>
 </p:sld>
 </file>
 

</xml_diff>